<commit_message>
Arquivos panelizados. Fim. Conforme enviado para Joy.
</commit_message>
<xml_diff>
--- a/Hardware/Gerbers/PCB.pptx
+++ b/Hardware/Gerbers/PCB.pptx
@@ -289,7 +289,7 @@
           <a:p>
             <a:fld id="{1492677E-FC71-4B79-AC34-B32B59634212}" type="datetimeFigureOut">
               <a:rPr lang="pt-BR" smtClean="0"/>
-              <a:t>24/09/2013</a:t>
+              <a:t>15/12/2013</a:t>
             </a:fld>
             <a:endParaRPr lang="pt-BR"/>
           </a:p>
@@ -459,7 +459,7 @@
           <a:p>
             <a:fld id="{1492677E-FC71-4B79-AC34-B32B59634212}" type="datetimeFigureOut">
               <a:rPr lang="pt-BR" smtClean="0"/>
-              <a:t>24/09/2013</a:t>
+              <a:t>15/12/2013</a:t>
             </a:fld>
             <a:endParaRPr lang="pt-BR"/>
           </a:p>
@@ -639,7 +639,7 @@
           <a:p>
             <a:fld id="{1492677E-FC71-4B79-AC34-B32B59634212}" type="datetimeFigureOut">
               <a:rPr lang="pt-BR" smtClean="0"/>
-              <a:t>24/09/2013</a:t>
+              <a:t>15/12/2013</a:t>
             </a:fld>
             <a:endParaRPr lang="pt-BR"/>
           </a:p>
@@ -809,7 +809,7 @@
           <a:p>
             <a:fld id="{1492677E-FC71-4B79-AC34-B32B59634212}" type="datetimeFigureOut">
               <a:rPr lang="pt-BR" smtClean="0"/>
-              <a:t>24/09/2013</a:t>
+              <a:t>15/12/2013</a:t>
             </a:fld>
             <a:endParaRPr lang="pt-BR"/>
           </a:p>
@@ -1055,7 +1055,7 @@
           <a:p>
             <a:fld id="{1492677E-FC71-4B79-AC34-B32B59634212}" type="datetimeFigureOut">
               <a:rPr lang="pt-BR" smtClean="0"/>
-              <a:t>24/09/2013</a:t>
+              <a:t>15/12/2013</a:t>
             </a:fld>
             <a:endParaRPr lang="pt-BR"/>
           </a:p>
@@ -1343,7 +1343,7 @@
           <a:p>
             <a:fld id="{1492677E-FC71-4B79-AC34-B32B59634212}" type="datetimeFigureOut">
               <a:rPr lang="pt-BR" smtClean="0"/>
-              <a:t>24/09/2013</a:t>
+              <a:t>15/12/2013</a:t>
             </a:fld>
             <a:endParaRPr lang="pt-BR"/>
           </a:p>
@@ -1765,7 +1765,7 @@
           <a:p>
             <a:fld id="{1492677E-FC71-4B79-AC34-B32B59634212}" type="datetimeFigureOut">
               <a:rPr lang="pt-BR" smtClean="0"/>
-              <a:t>24/09/2013</a:t>
+              <a:t>15/12/2013</a:t>
             </a:fld>
             <a:endParaRPr lang="pt-BR"/>
           </a:p>
@@ -1883,7 +1883,7 @@
           <a:p>
             <a:fld id="{1492677E-FC71-4B79-AC34-B32B59634212}" type="datetimeFigureOut">
               <a:rPr lang="pt-BR" smtClean="0"/>
-              <a:t>24/09/2013</a:t>
+              <a:t>15/12/2013</a:t>
             </a:fld>
             <a:endParaRPr lang="pt-BR"/>
           </a:p>
@@ -1978,7 +1978,7 @@
           <a:p>
             <a:fld id="{1492677E-FC71-4B79-AC34-B32B59634212}" type="datetimeFigureOut">
               <a:rPr lang="pt-BR" smtClean="0"/>
-              <a:t>24/09/2013</a:t>
+              <a:t>15/12/2013</a:t>
             </a:fld>
             <a:endParaRPr lang="pt-BR"/>
           </a:p>
@@ -2255,7 +2255,7 @@
           <a:p>
             <a:fld id="{1492677E-FC71-4B79-AC34-B32B59634212}" type="datetimeFigureOut">
               <a:rPr lang="pt-BR" smtClean="0"/>
-              <a:t>24/09/2013</a:t>
+              <a:t>15/12/2013</a:t>
             </a:fld>
             <a:endParaRPr lang="pt-BR"/>
           </a:p>
@@ -2508,7 +2508,7 @@
           <a:p>
             <a:fld id="{1492677E-FC71-4B79-AC34-B32B59634212}" type="datetimeFigureOut">
               <a:rPr lang="pt-BR" smtClean="0"/>
-              <a:t>24/09/2013</a:t>
+              <a:t>15/12/2013</a:t>
             </a:fld>
             <a:endParaRPr lang="pt-BR"/>
           </a:p>
@@ -2721,7 +2721,7 @@
           <a:p>
             <a:fld id="{1492677E-FC71-4B79-AC34-B32B59634212}" type="datetimeFigureOut">
               <a:rPr lang="pt-BR" smtClean="0"/>
-              <a:t>24/09/2013</a:t>
+              <a:t>15/12/2013</a:t>
             </a:fld>
             <a:endParaRPr lang="pt-BR"/>
           </a:p>
@@ -3490,7 +3490,7 @@
           <a:p>
             <a:r>
               <a:rPr lang="pt-BR" dirty="0" smtClean="0"/>
-              <a:t>RF.TOP</a:t>
+              <a:t>RF.GTL</a:t>
             </a:r>
             <a:endParaRPr lang="pt-BR" dirty="0"/>
           </a:p>
@@ -3520,7 +3520,7 @@
           <a:p>
             <a:r>
               <a:rPr lang="pt-BR" dirty="0" smtClean="0"/>
-              <a:t>RF.ITP</a:t>
+              <a:t>RF.GL2</a:t>
             </a:r>
             <a:endParaRPr lang="pt-BR" dirty="0"/>
           </a:p>
@@ -3550,7 +3550,7 @@
           <a:p>
             <a:r>
               <a:rPr lang="pt-BR" dirty="0" smtClean="0"/>
-              <a:t>RF.IBT</a:t>
+              <a:t>RF.GL3</a:t>
             </a:r>
             <a:endParaRPr lang="pt-BR" dirty="0"/>
           </a:p>
@@ -3580,7 +3580,7 @@
           <a:p>
             <a:r>
               <a:rPr lang="pt-BR" dirty="0" smtClean="0"/>
-              <a:t>RF.BOT</a:t>
+              <a:t>RF.GBL</a:t>
             </a:r>
             <a:endParaRPr lang="pt-BR" dirty="0"/>
           </a:p>
@@ -3730,7 +3730,7 @@
           <a:p>
             <a:r>
               <a:rPr lang="pt-BR" dirty="0" smtClean="0"/>
-              <a:t>RF.MTP</a:t>
+              <a:t>RF.GTS</a:t>
             </a:r>
             <a:endParaRPr lang="pt-BR" dirty="0"/>
           </a:p>
@@ -3760,7 +3760,7 @@
           <a:p>
             <a:r>
               <a:rPr lang="pt-BR" dirty="0" smtClean="0"/>
-              <a:t>RF.MBT</a:t>
+              <a:t>RF.GBS</a:t>
             </a:r>
             <a:endParaRPr lang="pt-BR" dirty="0"/>
           </a:p>
@@ -3848,7 +3848,7 @@
           <a:p>
             <a:r>
               <a:rPr lang="pt-BR" dirty="0" smtClean="0"/>
-              <a:t>RF.STP</a:t>
+              <a:t>RF.GTO</a:t>
             </a:r>
             <a:endParaRPr lang="pt-BR" dirty="0"/>
           </a:p>
@@ -3936,7 +3936,7 @@
           <a:p>
             <a:r>
               <a:rPr lang="pt-BR" dirty="0" smtClean="0"/>
-              <a:t>RF.SBT</a:t>
+              <a:t>RF.GBO</a:t>
             </a:r>
             <a:endParaRPr lang="pt-BR" dirty="0"/>
           </a:p>
@@ -4012,11 +4012,7 @@
           <a:p>
             <a:r>
               <a:rPr lang="pt-BR" dirty="0" smtClean="0"/>
-              <a:t>RF.TXT </a:t>
-            </a:r>
-            <a:r>
-              <a:rPr lang="pt-BR" dirty="0" smtClean="0"/>
-              <a:t>(All vias are pass-through)</a:t>
+              <a:t>RF.TXT (All vias are pass-through)</a:t>
             </a:r>
             <a:endParaRPr lang="pt-BR" dirty="0"/>
           </a:p>
@@ -4318,6 +4314,13 @@
   <p:clrMapOvr>
     <a:masterClrMapping/>
   </p:clrMapOvr>
+  <p:timing>
+    <p:tnLst>
+      <p:par>
+        <p:cTn id="1" dur="indefinite" restart="never" nodeType="tmRoot"/>
+      </p:par>
+    </p:tnLst>
+  </p:timing>
 </p:sld>
 </file>
 

</xml_diff>